<commit_message>
updated paper and slides with logit
</commit_message>
<xml_diff>
--- a/Predicting Bike Sharing Demand in Cities - Final.pptx
+++ b/Predicting Bike Sharing Demand in Cities - Final.pptx
@@ -5,7 +5,7 @@
     <p:sldMasterId id="2147483648" r:id="rId1"/>
   </p:sldMasterIdLst>
   <p:notesMasterIdLst>
-    <p:notesMasterId r:id="rId17"/>
+    <p:notesMasterId r:id="rId18"/>
   </p:notesMasterIdLst>
   <p:sldIdLst>
     <p:sldId id="256" r:id="rId2"/>
@@ -22,7 +22,8 @@
     <p:sldId id="268" r:id="rId13"/>
     <p:sldId id="267" r:id="rId14"/>
     <p:sldId id="269" r:id="rId15"/>
-    <p:sldId id="272" r:id="rId16"/>
+    <p:sldId id="274" r:id="rId16"/>
+    <p:sldId id="272" r:id="rId17"/>
   </p:sldIdLst>
   <p:sldSz cx="12192000" cy="6858000"/>
   <p:notesSz cx="6858000" cy="9144000"/>
@@ -132,9 +133,123 @@
 <file path=ppt/revisionInfo.xml><?xml version="1.0" encoding="utf-8"?>
 <p1510:revInfo xmlns:a="http://schemas.openxmlformats.org/drawingml/2006/main" xmlns:r="http://schemas.openxmlformats.org/officeDocument/2006/relationships" xmlns:p1510="http://schemas.microsoft.com/office/powerpoint/2015/10/main">
   <p1510:revLst>
-    <p1510:client id="{43985A27-BACE-4DF1-8D2E-C3735DB5220E}" v="23" dt="2023-10-25T22:31:43.646"/>
+    <p1510:client id="{4FD1933B-3604-4F7D-9256-94B4F8CA80C7}" v="2" dt="2023-12-15T02:18:39.791"/>
   </p1510:revLst>
 </p1510:revInfo>
+</file>
+
+<file path=ppt/changesInfos/changesInfo1.xml><?xml version="1.0" encoding="utf-8"?>
+<pc:chgInfo xmlns:a="http://schemas.openxmlformats.org/drawingml/2006/main" xmlns:r="http://schemas.openxmlformats.org/officeDocument/2006/relationships" xmlns:ac="http://schemas.microsoft.com/office/drawing/2013/main/command" xmlns:pc="http://schemas.microsoft.com/office/powerpoint/2013/main/command">
+  <pc:docChgLst>
+    <pc:chgData name="Crystal Kao" userId="83a127c155295ab2" providerId="LiveId" clId="{4FD1933B-3604-4F7D-9256-94B4F8CA80C7}"/>
+    <pc:docChg chg="custSel addSld delSld modSld">
+      <pc:chgData name="Crystal Kao" userId="83a127c155295ab2" providerId="LiveId" clId="{4FD1933B-3604-4F7D-9256-94B4F8CA80C7}" dt="2023-12-15T02:20:23.047" v="688" actId="20577"/>
+      <pc:docMkLst>
+        <pc:docMk/>
+      </pc:docMkLst>
+      <pc:sldChg chg="modSp mod">
+        <pc:chgData name="Crystal Kao" userId="83a127c155295ab2" providerId="LiveId" clId="{4FD1933B-3604-4F7D-9256-94B4F8CA80C7}" dt="2023-12-15T02:12:19.091" v="20"/>
+        <pc:sldMkLst>
+          <pc:docMk/>
+          <pc:sldMk cId="3309048914" sldId="258"/>
+        </pc:sldMkLst>
+        <pc:spChg chg="mod">
+          <ac:chgData name="Crystal Kao" userId="83a127c155295ab2" providerId="LiveId" clId="{4FD1933B-3604-4F7D-9256-94B4F8CA80C7}" dt="2023-12-15T02:12:19.091" v="20"/>
+          <ac:spMkLst>
+            <pc:docMk/>
+            <pc:sldMk cId="3309048914" sldId="258"/>
+            <ac:spMk id="3" creationId="{5993381E-8C27-3FC5-9A61-811DBC723149}"/>
+          </ac:spMkLst>
+        </pc:spChg>
+      </pc:sldChg>
+      <pc:sldChg chg="modSp mod">
+        <pc:chgData name="Crystal Kao" userId="83a127c155295ab2" providerId="LiveId" clId="{4FD1933B-3604-4F7D-9256-94B4F8CA80C7}" dt="2023-12-15T02:20:23.047" v="688" actId="20577"/>
+        <pc:sldMkLst>
+          <pc:docMk/>
+          <pc:sldMk cId="340166478" sldId="272"/>
+        </pc:sldMkLst>
+        <pc:spChg chg="mod">
+          <ac:chgData name="Crystal Kao" userId="83a127c155295ab2" providerId="LiveId" clId="{4FD1933B-3604-4F7D-9256-94B4F8CA80C7}" dt="2023-12-15T02:20:23.047" v="688" actId="20577"/>
+          <ac:spMkLst>
+            <pc:docMk/>
+            <pc:sldMk cId="340166478" sldId="272"/>
+            <ac:spMk id="3" creationId="{4F754BF5-0E55-6469-6482-C01987267E21}"/>
+          </ac:spMkLst>
+        </pc:spChg>
+      </pc:sldChg>
+      <pc:sldChg chg="modSp new del mod">
+        <pc:chgData name="Crystal Kao" userId="83a127c155295ab2" providerId="LiveId" clId="{4FD1933B-3604-4F7D-9256-94B4F8CA80C7}" dt="2023-12-15T02:19:16.458" v="575" actId="47"/>
+        <pc:sldMkLst>
+          <pc:docMk/>
+          <pc:sldMk cId="1384472763" sldId="273"/>
+        </pc:sldMkLst>
+        <pc:spChg chg="mod">
+          <ac:chgData name="Crystal Kao" userId="83a127c155295ab2" providerId="LiveId" clId="{4FD1933B-3604-4F7D-9256-94B4F8CA80C7}" dt="2023-12-15T02:12:39.476" v="26" actId="113"/>
+          <ac:spMkLst>
+            <pc:docMk/>
+            <pc:sldMk cId="1384472763" sldId="273"/>
+            <ac:spMk id="2" creationId="{736C3DC0-AD4B-A87A-60F6-69E096D5DB06}"/>
+          </ac:spMkLst>
+        </pc:spChg>
+      </pc:sldChg>
+      <pc:sldChg chg="addSp delSp modSp add mod">
+        <pc:chgData name="Crystal Kao" userId="83a127c155295ab2" providerId="LiveId" clId="{4FD1933B-3604-4F7D-9256-94B4F8CA80C7}" dt="2023-12-15T02:19:10.980" v="574" actId="404"/>
+        <pc:sldMkLst>
+          <pc:docMk/>
+          <pc:sldMk cId="2605229866" sldId="274"/>
+        </pc:sldMkLst>
+        <pc:spChg chg="mod">
+          <ac:chgData name="Crystal Kao" userId="83a127c155295ab2" providerId="LiveId" clId="{4FD1933B-3604-4F7D-9256-94B4F8CA80C7}" dt="2023-12-15T02:13:14.536" v="39" actId="20577"/>
+          <ac:spMkLst>
+            <pc:docMk/>
+            <pc:sldMk cId="2605229866" sldId="274"/>
+            <ac:spMk id="2" creationId="{40575A41-6664-79C2-1C6C-7F7EC6A8A341}"/>
+          </ac:spMkLst>
+        </pc:spChg>
+        <pc:spChg chg="mod">
+          <ac:chgData name="Crystal Kao" userId="83a127c155295ab2" providerId="LiveId" clId="{4FD1933B-3604-4F7D-9256-94B4F8CA80C7}" dt="2023-12-15T02:18:27.387" v="563" actId="14100"/>
+          <ac:spMkLst>
+            <pc:docMk/>
+            <pc:sldMk cId="2605229866" sldId="274"/>
+            <ac:spMk id="7" creationId="{B2DF9DC5-D5B0-2352-41D2-73435439C81B}"/>
+          </ac:spMkLst>
+        </pc:spChg>
+        <pc:spChg chg="add mod">
+          <ac:chgData name="Crystal Kao" userId="83a127c155295ab2" providerId="LiveId" clId="{4FD1933B-3604-4F7D-9256-94B4F8CA80C7}" dt="2023-12-15T02:19:10.980" v="574" actId="404"/>
+          <ac:spMkLst>
+            <pc:docMk/>
+            <pc:sldMk cId="2605229866" sldId="274"/>
+            <ac:spMk id="9" creationId="{6665DCF5-E0D3-9A37-20A3-492E8906ECE0}"/>
+          </ac:spMkLst>
+        </pc:spChg>
+        <pc:picChg chg="del">
+          <ac:chgData name="Crystal Kao" userId="83a127c155295ab2" providerId="LiveId" clId="{4FD1933B-3604-4F7D-9256-94B4F8CA80C7}" dt="2023-12-15T02:18:10.775" v="559" actId="478"/>
+          <ac:picMkLst>
+            <pc:docMk/>
+            <pc:sldMk cId="2605229866" sldId="274"/>
+            <ac:picMk id="5" creationId="{748BBEE6-CCE8-4B92-DC9E-0075A3FE7EC7}"/>
+          </ac:picMkLst>
+        </pc:picChg>
+        <pc:picChg chg="del">
+          <ac:chgData name="Crystal Kao" userId="83a127c155295ab2" providerId="LiveId" clId="{4FD1933B-3604-4F7D-9256-94B4F8CA80C7}" dt="2023-12-15T02:18:11.983" v="560" actId="478"/>
+          <ac:picMkLst>
+            <pc:docMk/>
+            <pc:sldMk cId="2605229866" sldId="274"/>
+            <ac:picMk id="6" creationId="{E5FD02FB-1B5F-FC52-97C3-341B952E8E3C}"/>
+          </ac:picMkLst>
+        </pc:picChg>
+        <pc:picChg chg="add mod">
+          <ac:chgData name="Crystal Kao" userId="83a127c155295ab2" providerId="LiveId" clId="{4FD1933B-3604-4F7D-9256-94B4F8CA80C7}" dt="2023-12-15T02:18:50.958" v="570" actId="1076"/>
+          <ac:picMkLst>
+            <pc:docMk/>
+            <pc:sldMk cId="2605229866" sldId="274"/>
+            <ac:picMk id="8" creationId="{3D010A73-46F0-3AD6-37B3-6319E9E9751C}"/>
+          </ac:picMkLst>
+        </pc:picChg>
+      </pc:sldChg>
+    </pc:docChg>
+  </pc:docChgLst>
+</pc:chgInfo>
 </file>
 
 <file path=ppt/notesMasters/notesMaster1.xml><?xml version="1.0" encoding="utf-8"?>
@@ -219,7 +334,7 @@
           <a:p>
             <a:fld id="{DE166066-BADD-4E6A-8D9C-2B2DBD5DCA01}" type="datetimeFigureOut">
               <a:rPr lang="en-US" smtClean="0"/>
-              <a:t>12/5/2023</a:t>
+              <a:t>12/14/2023</a:t>
             </a:fld>
             <a:endParaRPr lang="en-US"/>
           </a:p>
@@ -720,7 +835,7 @@
           <a:p>
             <a:fld id="{212C0288-B664-49D2-A256-B761E3989882}" type="datetime1">
               <a:rPr lang="en-US" smtClean="0"/>
-              <a:t>12/5/2023</a:t>
+              <a:t>12/14/2023</a:t>
             </a:fld>
             <a:endParaRPr lang="en-US"/>
           </a:p>
@@ -918,7 +1033,7 @@
           <a:p>
             <a:fld id="{74A73428-CE21-42D0-A789-29423C2A81A7}" type="datetime1">
               <a:rPr lang="en-US" smtClean="0"/>
-              <a:t>12/5/2023</a:t>
+              <a:t>12/14/2023</a:t>
             </a:fld>
             <a:endParaRPr lang="en-US"/>
           </a:p>
@@ -1126,7 +1241,7 @@
           <a:p>
             <a:fld id="{4E44410E-FDB6-456E-9FA5-15A15FB9401D}" type="datetime1">
               <a:rPr lang="en-US" smtClean="0"/>
-              <a:t>12/5/2023</a:t>
+              <a:t>12/14/2023</a:t>
             </a:fld>
             <a:endParaRPr lang="en-US"/>
           </a:p>
@@ -1324,7 +1439,7 @@
           <a:p>
             <a:fld id="{0F0D0B29-D4D5-4677-9837-1510B8EE2E78}" type="datetime1">
               <a:rPr lang="en-US" smtClean="0"/>
-              <a:t>12/5/2023</a:t>
+              <a:t>12/14/2023</a:t>
             </a:fld>
             <a:endParaRPr lang="en-US"/>
           </a:p>
@@ -1599,7 +1714,7 @@
           <a:p>
             <a:fld id="{91A22E55-8764-41B2-AF41-4B71AC25715D}" type="datetime1">
               <a:rPr lang="en-US" smtClean="0"/>
-              <a:t>12/5/2023</a:t>
+              <a:t>12/14/2023</a:t>
             </a:fld>
             <a:endParaRPr lang="en-US"/>
           </a:p>
@@ -1864,7 +1979,7 @@
           <a:p>
             <a:fld id="{7DB6C822-3743-4FC2-B3D6-FF9C91739C22}" type="datetime1">
               <a:rPr lang="en-US" smtClean="0"/>
-              <a:t>12/5/2023</a:t>
+              <a:t>12/14/2023</a:t>
             </a:fld>
             <a:endParaRPr lang="en-US"/>
           </a:p>
@@ -2276,7 +2391,7 @@
           <a:p>
             <a:fld id="{48D5274A-E278-4A58-B5EE-18E03581D90B}" type="datetime1">
               <a:rPr lang="en-US" smtClean="0"/>
-              <a:t>12/5/2023</a:t>
+              <a:t>12/14/2023</a:t>
             </a:fld>
             <a:endParaRPr lang="en-US"/>
           </a:p>
@@ -2417,7 +2532,7 @@
           <a:p>
             <a:fld id="{EFFA683A-1217-4075-9875-D956F513B376}" type="datetime1">
               <a:rPr lang="en-US" smtClean="0"/>
-              <a:t>12/5/2023</a:t>
+              <a:t>12/14/2023</a:t>
             </a:fld>
             <a:endParaRPr lang="en-US"/>
           </a:p>
@@ -2530,7 +2645,7 @@
           <a:p>
             <a:fld id="{A6B483D1-5C16-4DD5-A990-9B1008128D88}" type="datetime1">
               <a:rPr lang="en-US" smtClean="0"/>
-              <a:t>12/5/2023</a:t>
+              <a:t>12/14/2023</a:t>
             </a:fld>
             <a:endParaRPr lang="en-US"/>
           </a:p>
@@ -2841,7 +2956,7 @@
           <a:p>
             <a:fld id="{881C4768-7CB0-45B8-AF00-86DC0626E054}" type="datetime1">
               <a:rPr lang="en-US" smtClean="0"/>
-              <a:t>12/5/2023</a:t>
+              <a:t>12/14/2023</a:t>
             </a:fld>
             <a:endParaRPr lang="en-US"/>
           </a:p>
@@ -3129,7 +3244,7 @@
           <a:p>
             <a:fld id="{92EE5655-A835-457E-9383-C9F7E4BB9A4E}" type="datetime1">
               <a:rPr lang="en-US" smtClean="0"/>
-              <a:t>12/5/2023</a:t>
+              <a:t>12/14/2023</a:t>
             </a:fld>
             <a:endParaRPr lang="en-US"/>
           </a:p>
@@ -3370,7 +3485,7 @@
           <a:p>
             <a:fld id="{5E348CC8-58D4-4101-83F3-61940A381F27}" type="datetime1">
               <a:rPr lang="en-US" smtClean="0"/>
-              <a:t>12/5/2023</a:t>
+              <a:t>12/14/2023</a:t>
             </a:fld>
             <a:endParaRPr lang="en-US"/>
           </a:p>
@@ -5007,6 +5122,329 @@
           <p:cNvPr id="2" name="Title 1">
             <a:extLst>
               <a:ext uri="{FF2B5EF4-FFF2-40B4-BE49-F238E27FC236}">
+                <a16:creationId xmlns:a16="http://schemas.microsoft.com/office/drawing/2014/main" id="{40575A41-6664-79C2-1C6C-7F7EC6A8A341}"/>
+              </a:ext>
+            </a:extLst>
+          </p:cNvPr>
+          <p:cNvSpPr>
+            <a:spLocks noGrp="1"/>
+          </p:cNvSpPr>
+          <p:nvPr>
+            <p:ph type="title"/>
+          </p:nvPr>
+        </p:nvSpPr>
+        <p:spPr/>
+        <p:txBody>
+          <a:bodyPr/>
+          <a:lstStyle/>
+          <a:p>
+            <a:r>
+              <a:rPr lang="en-US" dirty="0"/>
+              <a:t>Logit Model</a:t>
+            </a:r>
+          </a:p>
+        </p:txBody>
+      </p:sp>
+      <p:sp>
+        <p:nvSpPr>
+          <p:cNvPr id="7" name="TextBox 6">
+            <a:extLst>
+              <a:ext uri="{FF2B5EF4-FFF2-40B4-BE49-F238E27FC236}">
+                <a16:creationId xmlns:a16="http://schemas.microsoft.com/office/drawing/2014/main" id="{B2DF9DC5-D5B0-2352-41D2-73435439C81B}"/>
+              </a:ext>
+            </a:extLst>
+          </p:cNvPr>
+          <p:cNvSpPr txBox="1"/>
+          <p:nvPr/>
+        </p:nvSpPr>
+        <p:spPr>
+          <a:xfrm>
+            <a:off x="638353" y="1690688"/>
+            <a:ext cx="10971756" cy="2585323"/>
+          </a:xfrm>
+          <a:prstGeom prst="rect">
+            <a:avLst/>
+          </a:prstGeom>
+          <a:noFill/>
+        </p:spPr>
+        <p:txBody>
+          <a:bodyPr wrap="square" rtlCol="0">
+            <a:spAutoFit/>
+          </a:bodyPr>
+          <a:lstStyle/>
+          <a:p>
+            <a:r>
+              <a:rPr lang="en-US" dirty="0"/>
+              <a:t>To answer the SMART question: Can we estimate when it is a holiday depending on other bikeshare factors, a logit model was used due to holiday being a categorical variable. </a:t>
+            </a:r>
+          </a:p>
+          <a:p>
+            <a:pPr marL="285750" indent="-285750">
+              <a:buFont typeface="Arial" panose="020B0604020202020204" pitchFamily="34" charset="0"/>
+              <a:buChar char="•"/>
+            </a:pPr>
+            <a:r>
+              <a:rPr lang="en-US" dirty="0">
+                <a:cs typeface="Arial" panose="020B0604020202020204" pitchFamily="34" charset="0"/>
+              </a:rPr>
+              <a:t>‘year’, ‘month’, ‘hour’, and ‘</a:t>
+            </a:r>
+            <a:r>
+              <a:rPr lang="en-US" dirty="0" err="1">
+                <a:cs typeface="Arial" panose="020B0604020202020204" pitchFamily="34" charset="0"/>
+              </a:rPr>
+              <a:t>dayofweek</a:t>
+            </a:r>
+            <a:r>
+              <a:rPr lang="en-US" dirty="0">
+                <a:cs typeface="Arial" panose="020B0604020202020204" pitchFamily="34" charset="0"/>
+              </a:rPr>
+              <a:t>’ were excluded logically based on how holidays work</a:t>
+            </a:r>
+          </a:p>
+          <a:p>
+            <a:pPr marL="285750" indent="-285750">
+              <a:buFont typeface="Arial" panose="020B0604020202020204" pitchFamily="34" charset="0"/>
+              <a:buChar char="•"/>
+            </a:pPr>
+            <a:r>
+              <a:rPr lang="en-US" dirty="0">
+                <a:cs typeface="Arial" panose="020B0604020202020204" pitchFamily="34" charset="0"/>
+              </a:rPr>
+              <a:t>‘</a:t>
+            </a:r>
+            <a:r>
+              <a:rPr lang="en-US" dirty="0" err="1">
+                <a:cs typeface="Arial" panose="020B0604020202020204" pitchFamily="34" charset="0"/>
+              </a:rPr>
+              <a:t>atemp</a:t>
+            </a:r>
+            <a:r>
+              <a:rPr lang="en-US" dirty="0">
+                <a:cs typeface="Arial" panose="020B0604020202020204" pitchFamily="34" charset="0"/>
+              </a:rPr>
+              <a:t>’ was excluded since ‘temp’ is already in the dataset</a:t>
+            </a:r>
+          </a:p>
+          <a:p>
+            <a:pPr marL="285750" indent="-285750">
+              <a:buFont typeface="Arial" panose="020B0604020202020204" pitchFamily="34" charset="0"/>
+              <a:buChar char="•"/>
+            </a:pPr>
+            <a:r>
+              <a:rPr lang="en-US" dirty="0">
+                <a:cs typeface="Arial" panose="020B0604020202020204" pitchFamily="34" charset="0"/>
+              </a:rPr>
+              <a:t>Made </a:t>
+            </a:r>
+            <a:r>
+              <a:rPr lang="en-US" dirty="0" err="1">
+                <a:cs typeface="Arial" panose="020B0604020202020204" pitchFamily="34" charset="0"/>
+              </a:rPr>
+              <a:t>workingday</a:t>
+            </a:r>
+            <a:r>
+              <a:rPr lang="en-US" dirty="0">
+                <a:cs typeface="Arial" panose="020B0604020202020204" pitchFamily="34" charset="0"/>
+              </a:rPr>
+              <a:t> into a factor </a:t>
+            </a:r>
+          </a:p>
+          <a:p>
+            <a:pPr marL="285750" indent="-285750">
+              <a:buFont typeface="Arial" panose="020B0604020202020204" pitchFamily="34" charset="0"/>
+              <a:buChar char="•"/>
+            </a:pPr>
+            <a:endParaRPr lang="en-US" dirty="0">
+              <a:cs typeface="Arial" panose="020B0604020202020204" pitchFamily="34" charset="0"/>
+            </a:endParaRPr>
+          </a:p>
+          <a:p>
+            <a:r>
+              <a:rPr lang="en-US" dirty="0">
+                <a:cs typeface="Arial" panose="020B0604020202020204" pitchFamily="34" charset="0"/>
+              </a:rPr>
+              <a:t>Based on running </a:t>
+            </a:r>
+            <a:r>
+              <a:rPr lang="en-US" dirty="0" err="1">
+                <a:cs typeface="Arial" panose="020B0604020202020204" pitchFamily="34" charset="0"/>
+              </a:rPr>
+              <a:t>bestglm</a:t>
+            </a:r>
+            <a:r>
+              <a:rPr lang="en-US" dirty="0">
+                <a:cs typeface="Arial" panose="020B0604020202020204" pitchFamily="34" charset="0"/>
+              </a:rPr>
+              <a:t>, the best model was found to </a:t>
+            </a:r>
+            <a:r>
+              <a:rPr lang="en-US" sz="1800" dirty="0">
+                <a:effectLst/>
+                <a:latin typeface="Calibri" panose="020F0502020204030204" pitchFamily="34" charset="0"/>
+                <a:ea typeface="DengXian" panose="02010600030101010101" pitchFamily="2" charset="-122"/>
+                <a:cs typeface="Times New Roman" panose="02020603050405020304" pitchFamily="18" charset="0"/>
+              </a:rPr>
+              <a:t>only be influenced by `season`, `windspeed` and `</a:t>
+            </a:r>
+            <a:r>
+              <a:rPr lang="en-US" sz="1800" dirty="0" err="1">
+                <a:effectLst/>
+                <a:latin typeface="Calibri" panose="020F0502020204030204" pitchFamily="34" charset="0"/>
+                <a:ea typeface="DengXian" panose="02010600030101010101" pitchFamily="2" charset="-122"/>
+                <a:cs typeface="Times New Roman" panose="02020603050405020304" pitchFamily="18" charset="0"/>
+              </a:rPr>
+              <a:t>workingday</a:t>
+            </a:r>
+            <a:r>
+              <a:rPr lang="en-US" sz="1800" dirty="0">
+                <a:effectLst/>
+                <a:latin typeface="Calibri" panose="020F0502020204030204" pitchFamily="34" charset="0"/>
+                <a:ea typeface="DengXian" panose="02010600030101010101" pitchFamily="2" charset="-122"/>
+                <a:cs typeface="Times New Roman" panose="02020603050405020304" pitchFamily="18" charset="0"/>
+              </a:rPr>
+              <a:t>`, with an AIC of 2082. </a:t>
+            </a:r>
+            <a:endParaRPr lang="en-US" dirty="0">
+              <a:cs typeface="Arial" panose="020B0604020202020204" pitchFamily="34" charset="0"/>
+            </a:endParaRPr>
+          </a:p>
+          <a:p>
+            <a:endParaRPr lang="en-US" dirty="0"/>
+          </a:p>
+        </p:txBody>
+      </p:sp>
+      <p:sp>
+        <p:nvSpPr>
+          <p:cNvPr id="3" name="Slide Number Placeholder 2">
+            <a:extLst>
+              <a:ext uri="{FF2B5EF4-FFF2-40B4-BE49-F238E27FC236}">
+                <a16:creationId xmlns:a16="http://schemas.microsoft.com/office/drawing/2014/main" id="{E5DB85CC-EA4A-4788-AF8E-E6BEA7564EF7}"/>
+              </a:ext>
+            </a:extLst>
+          </p:cNvPr>
+          <p:cNvSpPr>
+            <a:spLocks noGrp="1"/>
+          </p:cNvSpPr>
+          <p:nvPr>
+            <p:ph type="sldNum" sz="quarter" idx="12"/>
+          </p:nvPr>
+        </p:nvSpPr>
+        <p:spPr/>
+        <p:txBody>
+          <a:bodyPr/>
+          <a:lstStyle/>
+          <a:p>
+            <a:fld id="{FE55FE57-A2E5-4975-B9E5-5F10667C7C7A}" type="slidenum">
+              <a:rPr lang="en-US" smtClean="0"/>
+              <a:t>15</a:t>
+            </a:fld>
+            <a:endParaRPr lang="en-US"/>
+          </a:p>
+        </p:txBody>
+      </p:sp>
+      <p:pic>
+        <p:nvPicPr>
+          <p:cNvPr id="8" name="Picture 7">
+            <a:extLst>
+              <a:ext uri="{FF2B5EF4-FFF2-40B4-BE49-F238E27FC236}">
+                <a16:creationId xmlns:a16="http://schemas.microsoft.com/office/drawing/2014/main" id="{3D010A73-46F0-3AD6-37B3-6319E9E9751C}"/>
+              </a:ext>
+            </a:extLst>
+          </p:cNvPr>
+          <p:cNvPicPr>
+            <a:picLocks noChangeAspect="1"/>
+          </p:cNvPicPr>
+          <p:nvPr/>
+        </p:nvPicPr>
+        <p:blipFill>
+          <a:blip r:embed="rId2"/>
+          <a:stretch>
+            <a:fillRect/>
+          </a:stretch>
+        </p:blipFill>
+        <p:spPr>
+          <a:xfrm>
+            <a:off x="1708727" y="4276011"/>
+            <a:ext cx="8518806" cy="1907196"/>
+          </a:xfrm>
+          <a:prstGeom prst="rect">
+            <a:avLst/>
+          </a:prstGeom>
+        </p:spPr>
+      </p:pic>
+      <p:sp>
+        <p:nvSpPr>
+          <p:cNvPr id="9" name="TextBox 8">
+            <a:extLst>
+              <a:ext uri="{FF2B5EF4-FFF2-40B4-BE49-F238E27FC236}">
+                <a16:creationId xmlns:a16="http://schemas.microsoft.com/office/drawing/2014/main" id="{6665DCF5-E0D3-9A37-20A3-492E8906ECE0}"/>
+              </a:ext>
+            </a:extLst>
+          </p:cNvPr>
+          <p:cNvSpPr txBox="1"/>
+          <p:nvPr/>
+        </p:nvSpPr>
+        <p:spPr>
+          <a:xfrm>
+            <a:off x="1748551" y="4657505"/>
+            <a:ext cx="8478982" cy="338554"/>
+          </a:xfrm>
+          <a:prstGeom prst="rect">
+            <a:avLst/>
+          </a:prstGeom>
+          <a:noFill/>
+          <a:ln w="38100">
+            <a:solidFill>
+              <a:srgbClr val="C00000"/>
+            </a:solidFill>
+          </a:ln>
+        </p:spPr>
+        <p:txBody>
+          <a:bodyPr wrap="square" rtlCol="0">
+            <a:spAutoFit/>
+          </a:bodyPr>
+          <a:lstStyle/>
+          <a:p>
+            <a:endParaRPr lang="en-US" sz="1600" dirty="0"/>
+          </a:p>
+        </p:txBody>
+      </p:sp>
+    </p:spTree>
+    <p:extLst>
+      <p:ext uri="{BB962C8B-B14F-4D97-AF65-F5344CB8AC3E}">
+        <p14:creationId xmlns:p14="http://schemas.microsoft.com/office/powerpoint/2010/main" val="2605229866"/>
+      </p:ext>
+    </p:extLst>
+  </p:cSld>
+  <p:clrMapOvr>
+    <a:masterClrMapping/>
+  </p:clrMapOvr>
+</p:sld>
+</file>
+
+<file path=ppt/slides/slide16.xml><?xml version="1.0" encoding="utf-8"?>
+<p:sld xmlns:a="http://schemas.openxmlformats.org/drawingml/2006/main" xmlns:r="http://schemas.openxmlformats.org/officeDocument/2006/relationships" xmlns:p="http://schemas.openxmlformats.org/presentationml/2006/main">
+  <p:cSld>
+    <p:spTree>
+      <p:nvGrpSpPr>
+        <p:cNvPr id="1" name=""/>
+        <p:cNvGrpSpPr/>
+        <p:nvPr/>
+      </p:nvGrpSpPr>
+      <p:grpSpPr>
+        <a:xfrm>
+          <a:off x="0" y="0"/>
+          <a:ext cx="0" cy="0"/>
+          <a:chOff x="0" y="0"/>
+          <a:chExt cx="0" cy="0"/>
+        </a:xfrm>
+      </p:grpSpPr>
+      <p:sp>
+        <p:nvSpPr>
+          <p:cNvPr id="2" name="Title 1">
+            <a:extLst>
+              <a:ext uri="{FF2B5EF4-FFF2-40B4-BE49-F238E27FC236}">
                 <a16:creationId xmlns:a16="http://schemas.microsoft.com/office/drawing/2014/main" id="{803CF1AC-6D3A-B528-C48A-F81FB7D93E77}"/>
               </a:ext>
             </a:extLst>
@@ -5048,7 +5486,9 @@
         </p:nvSpPr>
         <p:spPr/>
         <p:txBody>
-          <a:bodyPr/>
+          <a:bodyPr>
+            <a:normAutofit fontScale="92500" lnSpcReduction="10000"/>
+          </a:bodyPr>
           <a:lstStyle/>
           <a:p>
             <a:r>
@@ -5113,6 +5553,49 @@
               <a:rPr lang="en-US" dirty="0"/>
               <a:t>ajority of them renting bikes on days where temperature is between 20-30 Celsius.</a:t>
             </a:r>
+          </a:p>
+          <a:p>
+            <a:pPr lvl="1"/>
+            <a:r>
+              <a:rPr lang="en-US" dirty="0"/>
+              <a:t>Can we estimate when it is a holiday depending on other bikeshare factors?</a:t>
+            </a:r>
+          </a:p>
+          <a:p>
+            <a:pPr lvl="2"/>
+            <a:r>
+              <a:rPr lang="en-US" dirty="0">
+                <a:cs typeface="Arial" panose="020B0604020202020204" pitchFamily="34" charset="0"/>
+              </a:rPr>
+              <a:t>Yes, the best model for finding out if a day is a holiday is based on </a:t>
+            </a:r>
+            <a:r>
+              <a:rPr lang="en-US" sz="2000" dirty="0">
+                <a:effectLst/>
+                <a:latin typeface="Calibri" panose="020F0502020204030204" pitchFamily="34" charset="0"/>
+                <a:ea typeface="DengXian" panose="02010600030101010101" pitchFamily="2" charset="-122"/>
+                <a:cs typeface="Times New Roman" panose="02020603050405020304" pitchFamily="18" charset="0"/>
+              </a:rPr>
+              <a:t>`season`, `windspeed` and `</a:t>
+            </a:r>
+            <a:r>
+              <a:rPr lang="en-US" sz="2000" dirty="0" err="1">
+                <a:effectLst/>
+                <a:latin typeface="Calibri" panose="020F0502020204030204" pitchFamily="34" charset="0"/>
+                <a:ea typeface="DengXian" panose="02010600030101010101" pitchFamily="2" charset="-122"/>
+                <a:cs typeface="Times New Roman" panose="02020603050405020304" pitchFamily="18" charset="0"/>
+              </a:rPr>
+              <a:t>workingday</a:t>
+            </a:r>
+            <a:r>
+              <a:rPr lang="en-US" sz="2000" dirty="0">
+                <a:effectLst/>
+                <a:latin typeface="Calibri" panose="020F0502020204030204" pitchFamily="34" charset="0"/>
+                <a:ea typeface="DengXian" panose="02010600030101010101" pitchFamily="2" charset="-122"/>
+                <a:cs typeface="Times New Roman" panose="02020603050405020304" pitchFamily="18" charset="0"/>
+              </a:rPr>
+              <a:t>`.</a:t>
+            </a:r>
             <a:endParaRPr lang="en-US" dirty="0">
               <a:cs typeface="Arial" panose="020B0604020202020204" pitchFamily="34" charset="0"/>
             </a:endParaRPr>
@@ -5146,7 +5629,7 @@
           <a:p>
             <a:fld id="{FE55FE57-A2E5-4975-B9E5-5F10667C7C7A}" type="slidenum">
               <a:rPr lang="en-US" smtClean="0"/>
-              <a:t>15</a:t>
+              <a:t>16</a:t>
             </a:fld>
             <a:endParaRPr lang="en-US"/>
           </a:p>
@@ -5351,6 +5834,15 @@
                 <a:cs typeface="Arial" panose="020B0604020202020204" pitchFamily="34" charset="0"/>
               </a:rPr>
               <a:t>When do casual bikers increase the most?</a:t>
+            </a:r>
+          </a:p>
+          <a:p>
+            <a:pPr lvl="1"/>
+            <a:r>
+              <a:rPr lang="en-US" dirty="0">
+                <a:cs typeface="Arial" panose="020B0604020202020204" pitchFamily="34" charset="0"/>
+              </a:rPr>
+              <a:t>Can we estimate when it is a holiday depending on other bikeshare factors?</a:t>
             </a:r>
           </a:p>
         </p:txBody>

</xml_diff>